<commit_message>
Updated with Fabian comments and slides updated
</commit_message>
<xml_diff>
--- a/final_presentation/finalPpt1.4.pptx
+++ b/final_presentation/finalPpt1.4.pptx
@@ -46,7 +46,7 @@
     <p:sldId id="412" r:id="rId34"/>
   </p:sldIdLst>
   <p:sldSz cx="9144000" cy="6858000" type="screen4x3"/>
-  <p:notesSz cx="9925050" cy="6665913"/>
+  <p:notesSz cx="6797675" cy="9926638"/>
   <p:custDataLst>
     <p:tags r:id="rId37"/>
   </p:custDataLst>
@@ -192,12 +192,12 @@
     </p:ext>
     <p:ext uri="{2D200454-40CA-4A62-9FC3-DE9A4176ACB9}">
       <p15:notesGuideLst xmlns:p15="http://schemas.microsoft.com/office/powerpoint/2012/main">
-        <p15:guide id="1" orient="horz" pos="2100">
+        <p15:guide id="1" orient="horz" pos="3128" userDrawn="1">
           <p15:clr>
             <a:srgbClr val="A4A3A4"/>
           </p15:clr>
         </p15:guide>
-        <p15:guide id="2" pos="3126">
+        <p15:guide id="2" pos="2142" userDrawn="1">
           <p15:clr>
             <a:srgbClr val="A4A3A4"/>
           </p15:clr>
@@ -242,15 +242,15 @@
         </p:nvSpPr>
         <p:spPr>
           <a:xfrm>
-            <a:off x="2" y="0"/>
-            <a:ext cx="4300855" cy="333296"/>
+            <a:off x="2" y="1"/>
+            <a:ext cx="2945659" cy="496332"/>
           </a:xfrm>
           <a:prstGeom prst="rect">
             <a:avLst/>
           </a:prstGeom>
         </p:spPr>
         <p:txBody>
-          <a:bodyPr vert="horz" lIns="90708" tIns="45354" rIns="90708" bIns="45354" rtlCol="0"/>
+          <a:bodyPr vert="horz" lIns="91434" tIns="45717" rIns="91434" bIns="45717" rtlCol="0"/>
           <a:lstStyle>
             <a:lvl1pPr algn="l" fontAlgn="auto">
               <a:spcBef>
@@ -285,15 +285,15 @@
         </p:nvSpPr>
         <p:spPr>
           <a:xfrm>
-            <a:off x="5621901" y="0"/>
-            <a:ext cx="4300855" cy="333296"/>
+            <a:off x="3850445" y="1"/>
+            <a:ext cx="2945659" cy="496332"/>
           </a:xfrm>
           <a:prstGeom prst="rect">
             <a:avLst/>
           </a:prstGeom>
         </p:spPr>
         <p:txBody>
-          <a:bodyPr vert="horz" lIns="90708" tIns="45354" rIns="90708" bIns="45354" rtlCol="0"/>
+          <a:bodyPr vert="horz" lIns="91434" tIns="45717" rIns="91434" bIns="45717" rtlCol="0"/>
           <a:lstStyle>
             <a:lvl1pPr algn="r" fontAlgn="auto">
               <a:spcBef>
@@ -335,15 +335,15 @@
         </p:nvSpPr>
         <p:spPr>
           <a:xfrm>
-            <a:off x="2" y="6331460"/>
-            <a:ext cx="4300855" cy="333296"/>
+            <a:off x="2" y="9428583"/>
+            <a:ext cx="2945659" cy="496332"/>
           </a:xfrm>
           <a:prstGeom prst="rect">
             <a:avLst/>
           </a:prstGeom>
         </p:spPr>
         <p:txBody>
-          <a:bodyPr vert="horz" lIns="90708" tIns="45354" rIns="90708" bIns="45354" rtlCol="0" anchor="b"/>
+          <a:bodyPr vert="horz" lIns="91434" tIns="45717" rIns="91434" bIns="45717" rtlCol="0" anchor="b"/>
           <a:lstStyle>
             <a:lvl1pPr algn="l" fontAlgn="auto">
               <a:spcBef>
@@ -378,15 +378,15 @@
         </p:nvSpPr>
         <p:spPr>
           <a:xfrm>
-            <a:off x="5621901" y="6331460"/>
-            <a:ext cx="4300855" cy="333296"/>
+            <a:off x="3850445" y="9428583"/>
+            <a:ext cx="2945659" cy="496332"/>
           </a:xfrm>
           <a:prstGeom prst="rect">
             <a:avLst/>
           </a:prstGeom>
         </p:spPr>
         <p:txBody>
-          <a:bodyPr vert="horz" lIns="90708" tIns="45354" rIns="90708" bIns="45354" rtlCol="0" anchor="b"/>
+          <a:bodyPr vert="horz" lIns="91434" tIns="45717" rIns="91434" bIns="45717" rtlCol="0" anchor="b"/>
           <a:lstStyle>
             <a:lvl1pPr algn="r" fontAlgn="auto">
               <a:spcBef>
@@ -461,15 +461,15 @@
         </p:nvSpPr>
         <p:spPr>
           <a:xfrm>
-            <a:off x="2" y="0"/>
-            <a:ext cx="4300855" cy="333296"/>
+            <a:off x="2" y="1"/>
+            <a:ext cx="2945659" cy="496332"/>
           </a:xfrm>
           <a:prstGeom prst="rect">
             <a:avLst/>
           </a:prstGeom>
         </p:spPr>
         <p:txBody>
-          <a:bodyPr vert="horz" lIns="90708" tIns="45354" rIns="90708" bIns="45354" rtlCol="0"/>
+          <a:bodyPr vert="horz" lIns="91434" tIns="45717" rIns="91434" bIns="45717" rtlCol="0"/>
           <a:lstStyle>
             <a:lvl1pPr algn="l" fontAlgn="auto">
               <a:spcBef>
@@ -504,15 +504,15 @@
         </p:nvSpPr>
         <p:spPr>
           <a:xfrm>
-            <a:off x="5621901" y="0"/>
-            <a:ext cx="4300855" cy="333296"/>
+            <a:off x="3850445" y="1"/>
+            <a:ext cx="2945659" cy="496332"/>
           </a:xfrm>
           <a:prstGeom prst="rect">
             <a:avLst/>
           </a:prstGeom>
         </p:spPr>
         <p:txBody>
-          <a:bodyPr vert="horz" lIns="90708" tIns="45354" rIns="90708" bIns="45354" rtlCol="0"/>
+          <a:bodyPr vert="horz" lIns="91434" tIns="45717" rIns="91434" bIns="45717" rtlCol="0"/>
           <a:lstStyle>
             <a:lvl1pPr algn="r" fontAlgn="auto">
               <a:spcBef>
@@ -554,8 +554,8 @@
         </p:nvSpPr>
         <p:spPr>
           <a:xfrm>
-            <a:off x="3295650" y="500063"/>
-            <a:ext cx="3333750" cy="2500312"/>
+            <a:off x="917575" y="744538"/>
+            <a:ext cx="4962525" cy="3722687"/>
           </a:xfrm>
           <a:prstGeom prst="rect">
             <a:avLst/>
@@ -568,7 +568,7 @@
           </a:ln>
         </p:spPr>
         <p:txBody>
-          <a:bodyPr vert="horz" lIns="90708" tIns="45354" rIns="90708" bIns="45354" rtlCol="0" anchor="ctr"/>
+          <a:bodyPr vert="horz" lIns="91434" tIns="45717" rIns="91434" bIns="45717" rtlCol="0" anchor="ctr"/>
           <a:lstStyle/>
           <a:p>
             <a:pPr lvl="0"/>
@@ -588,15 +588,15 @@
         </p:nvSpPr>
         <p:spPr>
           <a:xfrm>
-            <a:off x="992506" y="3166309"/>
-            <a:ext cx="7940040" cy="2999661"/>
+            <a:off x="679768" y="4715155"/>
+            <a:ext cx="5438140" cy="4466988"/>
           </a:xfrm>
           <a:prstGeom prst="rect">
             <a:avLst/>
           </a:prstGeom>
         </p:spPr>
         <p:txBody>
-          <a:bodyPr vert="horz" wrap="square" lIns="90708" tIns="45354" rIns="90708" bIns="45354" numCol="1" anchor="t" anchorCtr="0" compatLnSpc="1">
+          <a:bodyPr vert="horz" wrap="square" lIns="91434" tIns="45717" rIns="91434" bIns="45717" numCol="1" anchor="t" anchorCtr="0" compatLnSpc="1">
             <a:prstTxWarp prst="textNoShape">
               <a:avLst/>
             </a:prstTxWarp>
@@ -653,15 +653,15 @@
         </p:nvSpPr>
         <p:spPr>
           <a:xfrm>
-            <a:off x="2" y="6331460"/>
-            <a:ext cx="4300855" cy="333296"/>
+            <a:off x="2" y="9428583"/>
+            <a:ext cx="2945659" cy="496332"/>
           </a:xfrm>
           <a:prstGeom prst="rect">
             <a:avLst/>
           </a:prstGeom>
         </p:spPr>
         <p:txBody>
-          <a:bodyPr vert="horz" lIns="90708" tIns="45354" rIns="90708" bIns="45354" rtlCol="0" anchor="b"/>
+          <a:bodyPr vert="horz" lIns="91434" tIns="45717" rIns="91434" bIns="45717" rtlCol="0" anchor="b"/>
           <a:lstStyle>
             <a:lvl1pPr algn="l" fontAlgn="auto">
               <a:spcBef>
@@ -696,15 +696,15 @@
         </p:nvSpPr>
         <p:spPr>
           <a:xfrm>
-            <a:off x="5621901" y="6331460"/>
-            <a:ext cx="4300855" cy="333296"/>
+            <a:off x="3850445" y="9428583"/>
+            <a:ext cx="2945659" cy="496332"/>
           </a:xfrm>
           <a:prstGeom prst="rect">
             <a:avLst/>
           </a:prstGeom>
         </p:spPr>
         <p:txBody>
-          <a:bodyPr vert="horz" lIns="90708" tIns="45354" rIns="90708" bIns="45354" rtlCol="0" anchor="b"/>
+          <a:bodyPr vert="horz" lIns="91434" tIns="45717" rIns="91434" bIns="45717" rtlCol="0" anchor="b"/>
           <a:lstStyle>
             <a:lvl1pPr algn="r" fontAlgn="auto">
               <a:spcBef>
@@ -904,8 +904,8 @@
         </p:nvSpPr>
         <p:spPr>
           <a:xfrm>
-            <a:off x="3295650" y="500063"/>
-            <a:ext cx="3333750" cy="2500312"/>
+            <a:off x="917575" y="744538"/>
+            <a:ext cx="4962525" cy="3722687"/>
           </a:xfrm>
         </p:spPr>
       </p:sp>
@@ -8271,7 +8271,7 @@
       </p:sp>
       <p:sp>
         <p:nvSpPr>
-          <p:cNvPr id="88" name="RS_Classification_Standard"/>
+          <p:cNvPr id="95" name="RS_Classification_Standard"/>
           <p:cNvSpPr txBox="1"/>
           <p:nvPr/>
         </p:nvSpPr>
@@ -8523,7 +8523,7 @@
       </p:sp>
       <p:sp>
         <p:nvSpPr>
-          <p:cNvPr id="89" name="RS_Classification_Standard"/>
+          <p:cNvPr id="96" name="RS_Classification_Standard"/>
           <p:cNvSpPr txBox="1"/>
           <p:nvPr/>
         </p:nvSpPr>
@@ -8779,7 +8779,7 @@
       </p:pic>
       <p:sp>
         <p:nvSpPr>
-          <p:cNvPr id="184" name="RS_Classification_Standard"/>
+          <p:cNvPr id="191" name="RS_Classification_Standard"/>
           <p:cNvSpPr txBox="1"/>
           <p:nvPr/>
         </p:nvSpPr>
@@ -9087,7 +9087,7 @@
       </p:pic>
       <p:sp>
         <p:nvSpPr>
-          <p:cNvPr id="88" name="RS_Classification_Standard"/>
+          <p:cNvPr id="95" name="RS_Classification_Standard"/>
           <p:cNvSpPr txBox="1"/>
           <p:nvPr/>
         </p:nvSpPr>
@@ -10064,7 +10064,7 @@
                 <a14:m>
                   <m:oMath xmlns:m="http://schemas.openxmlformats.org/officeDocument/2006/math">
                     <m:r>
-                      <a:rPr lang="en-US" i="1">
+                      <a:rPr lang="en-US" i="0">
                         <a:solidFill>
                           <a:prstClr val="black"/>
                         </a:solidFill>
@@ -10074,16 +10074,19 @@
                       <m:t>∕∕</m:t>
                     </m:r>
                     <m:r>
-                      <a:rPr lang="en-US" i="1">
+                      <m:rPr>
+                        <m:sty m:val="p"/>
+                      </m:rPr>
+                      <a:rPr lang="en-US" i="0">
                         <a:solidFill>
                           <a:prstClr val="black"/>
                         </a:solidFill>
                         <a:latin typeface="Cambria Math" panose="02040503050406030204" pitchFamily="18" charset="0"/>
                       </a:rPr>
-                      <m:t>𝑆𝑢𝑝𝑒𝑟𝑓𝑙𝑢𝑜𝑢𝑠</m:t>
+                      <m:t>Superfluous</m:t>
                     </m:r>
                     <m:r>
-                      <a:rPr lang="en-US" i="1">
+                      <a:rPr lang="en-US" i="0">
                         <a:solidFill>
                           <a:prstClr val="black"/>
                         </a:solidFill>
@@ -10092,13 +10095,16 @@
                       <m:t> </m:t>
                     </m:r>
                     <m:r>
-                      <a:rPr lang="en-US" i="1">
+                      <m:rPr>
+                        <m:sty m:val="p"/>
+                      </m:rPr>
+                      <a:rPr lang="en-US" i="0">
                         <a:solidFill>
                           <a:prstClr val="black"/>
                         </a:solidFill>
                         <a:latin typeface="Cambria Math" panose="02040503050406030204" pitchFamily="18" charset="0"/>
                       </a:rPr>
-                      <m:t>𝑐𝑜𝑝𝑦𝑖𝑛𝑔</m:t>
+                      <m:t>copying</m:t>
                     </m:r>
                   </m:oMath>
                 </a14:m>
@@ -14450,7 +14456,7 @@
       </p:sp>
       <p:sp>
         <p:nvSpPr>
-          <p:cNvPr id="480" name="RS_Classification_Standard"/>
+          <p:cNvPr id="487" name="RS_Classification_Standard"/>
           <p:cNvSpPr txBox="1"/>
           <p:nvPr/>
         </p:nvSpPr>
@@ -15166,7 +15172,7 @@
       </p:sp>
       <p:sp>
         <p:nvSpPr>
-          <p:cNvPr id="665" name="RS_Classification_Standard"/>
+          <p:cNvPr id="673" name="RS_Classification_Standard"/>
           <p:cNvSpPr txBox="1"/>
           <p:nvPr/>
         </p:nvSpPr>
@@ -16117,7 +16123,7 @@
       </p:sp>
       <p:sp>
         <p:nvSpPr>
-          <p:cNvPr id="186" name="RS_Classification_Standard"/>
+          <p:cNvPr id="610" name="RS_Classification_Standard"/>
           <p:cNvSpPr txBox="1"/>
           <p:nvPr/>
         </p:nvSpPr>
@@ -16281,24 +16287,21 @@
             </a:pPr>
             <a:r>
               <a:rPr lang="en-US" dirty="0"/>
-              <a:t>Decoding FEC chain for Physical Uplink Control Channel (</a:t>
-            </a:r>
-            <a:r>
-              <a:rPr lang="en-US" i="1" dirty="0"/>
-              <a:t>PUCCH</a:t>
+              <a:t>Decoding FEC chain </a:t>
+            </a:r>
+            <a:r>
+              <a:rPr lang="en-US" dirty="0" smtClean="0"/>
+              <a:t>for Uplink Control </a:t>
             </a:r>
             <a:r>
               <a:rPr lang="en-US" dirty="0"/>
-              <a:t>) and Physical uplink shared Channel (</a:t>
-            </a:r>
-            <a:r>
-              <a:rPr lang="en-US" i="1" dirty="0"/>
-              <a:t>PUSCH</a:t>
-            </a:r>
-            <a:r>
-              <a:rPr lang="en-US" dirty="0"/>
-              <a:t>).</a:t>
-            </a:r>
+              <a:t>I</a:t>
+            </a:r>
+            <a:r>
+              <a:rPr lang="en-US" dirty="0" smtClean="0"/>
+              <a:t>nformation (UCI)</a:t>
+            </a:r>
+            <a:endParaRPr lang="en-US" dirty="0"/>
           </a:p>
         </p:txBody>
       </p:sp>
@@ -16341,7 +16344,7 @@
       </p:pic>
       <p:sp>
         <p:nvSpPr>
-          <p:cNvPr id="504" name="RS_Classification_Standard"/>
+          <p:cNvPr id="511" name="RS_Classification_Standard"/>
           <p:cNvSpPr txBox="1"/>
           <p:nvPr/>
         </p:nvSpPr>
@@ -16748,7 +16751,7 @@
       </p:pic>
       <p:sp>
         <p:nvSpPr>
-          <p:cNvPr id="152" name="RS_Classification_Standard"/>
+          <p:cNvPr id="159" name="RS_Classification_Standard"/>
           <p:cNvSpPr txBox="1"/>
           <p:nvPr/>
         </p:nvSpPr>
@@ -18185,8 +18188,8 @@
           </p:sp>
         </mc:Fallback>
       </mc:AlternateContent>
-      <mc:AlternateContent xmlns:mc="http://schemas.openxmlformats.org/markup-compatibility/2006" xmlns:a14="http://schemas.microsoft.com/office/drawing/2010/main">
-        <mc:Choice Requires="a14">
+      <mc:AlternateContent xmlns:mc="http://schemas.openxmlformats.org/markup-compatibility/2006">
+        <mc:Choice xmlns:a14="http://schemas.microsoft.com/office/drawing/2010/main" Requires="a14">
           <p:sp>
             <p:nvSpPr>
               <p:cNvPr id="457" name="Content Placeholder 1"/>
@@ -18387,7 +18390,7 @@
                   <a:buFont typeface="Arial" panose="020B0604020202020204" pitchFamily="34" charset="0"/>
                   <a:buChar char="•"/>
                 </a:pPr>
-                <a:endParaRPr lang="en-US" sz="1200" dirty="0">
+                <a:endParaRPr lang="en-US" sz="1200" dirty="0" smtClean="0">
                   <a:solidFill>
                     <a:prstClr val="black"/>
                   </a:solidFill>
@@ -19252,6 +19255,15 @@
                               </m:sSubPr>
                               <m:e>
                                 <m:r>
+                                  <a:rPr lang="en-US" sz="1200" b="0" i="1" smtClean="0">
+                                    <a:solidFill>
+                                      <a:prstClr val="black"/>
+                                    </a:solidFill>
+                                    <a:latin typeface="Cambria Math" panose="02040503050406030204" pitchFamily="18" charset="0"/>
+                                  </a:rPr>
+                                  <m:t> </m:t>
+                                </m:r>
+                                <m:r>
                                   <a:rPr lang="en-US" sz="1200" i="1">
                                     <a:solidFill>
                                       <a:prstClr val="black"/>
@@ -19331,44 +19343,49 @@
                                 </a:solidFill>
                                 <a:latin typeface="Cambria Math" panose="02040503050406030204" pitchFamily="18" charset="0"/>
                               </a:rPr>
-                              <m:t>              </m:t>
+                              <m:t>            </m:t>
                             </m:r>
                             <m:r>
-                              <a:rPr lang="en-US" sz="1200" i="1">
+                              <a:rPr lang="en-US" sz="1200" b="0" i="0" smtClean="0">
+                                <a:solidFill>
+                                  <a:prstClr val="black"/>
+                                </a:solidFill>
+                                <a:latin typeface="Cambria Math" panose="02040503050406030204" pitchFamily="18" charset="0"/>
+                              </a:rPr>
+                              <m:t>//</m:t>
+                            </m:r>
+                            <m:r>
+                              <m:rPr>
+                                <m:sty m:val="p"/>
+                              </m:rPr>
+                              <a:rPr lang="en-US" sz="1200" b="0" i="0" smtClean="0">
+                                <a:solidFill>
+                                  <a:prstClr val="black"/>
+                                </a:solidFill>
+                                <a:latin typeface="+mj-lt"/>
+                                <a:ea typeface="Cambria Math" panose="02040503050406030204" pitchFamily="18" charset="0"/>
+                              </a:rPr>
+                              <m:t>superfluous</m:t>
+                            </m:r>
+                            <m:r>
+                              <a:rPr lang="en-US" sz="1200" b="0" i="1" smtClean="0">
                                 <a:solidFill>
                                   <a:prstClr val="black"/>
                                 </a:solidFill>
                                 <a:latin typeface="Cambria Math" panose="02040503050406030204" pitchFamily="18" charset="0"/>
                                 <a:ea typeface="Cambria Math" panose="02040503050406030204" pitchFamily="18" charset="0"/>
                               </a:rPr>
-                              <m:t>∕∕</m:t>
+                              <m:t> </m:t>
                             </m:r>
                             <m:r>
-                              <a:rPr lang="en-US" sz="1200" i="1">
+                              <a:rPr lang="en-US" sz="1200" b="0" i="1" smtClean="0">
                                 <a:solidFill>
                                   <a:prstClr val="black"/>
                                 </a:solidFill>
                                 <a:latin typeface="Cambria Math" panose="02040503050406030204" pitchFamily="18" charset="0"/>
+                                <a:ea typeface="Cambria Math" panose="02040503050406030204" pitchFamily="18" charset="0"/>
                               </a:rPr>
-                              <m:t>𝐽𝑢𝑠𝑡</m:t>
-                            </m:r>
-                            <m:r>
-                              <a:rPr lang="en-US" sz="1200" i="1">
-                                <a:solidFill>
-                                  <a:prstClr val="black"/>
-                                </a:solidFill>
-                                <a:latin typeface="Cambria Math" panose="02040503050406030204" pitchFamily="18" charset="0"/>
-                              </a:rPr>
-                              <m:t> </m:t>
-                            </m:r>
-                            <m:r>
-                              <a:rPr lang="en-US" sz="1200" i="1">
-                                <a:solidFill>
-                                  <a:prstClr val="black"/>
-                                </a:solidFill>
-                                <a:latin typeface="Cambria Math" panose="02040503050406030204" pitchFamily="18" charset="0"/>
-                              </a:rPr>
-                              <m:t>𝑐𝑜𝑝𝑦𝑖𝑛𝑔</m:t>
+                              <m:t>𝑐𝑜𝑝𝑦</m:t>
                             </m:r>
                           </m:e>
                         </m:eqArr>
@@ -19389,7 +19406,7 @@
             </p:txBody>
           </p:sp>
         </mc:Choice>
-        <mc:Fallback xmlns="">
+        <mc:Fallback>
           <p:sp>
             <p:nvSpPr>
               <p:cNvPr id="457" name="Content Placeholder 1"/>
@@ -19409,7 +19426,7 @@
               <a:blipFill>
                 <a:blip r:embed="rId5"/>
                 <a:stretch>
-                  <a:fillRect l="-2532" b="-52355"/>
+                  <a:fillRect l="-2532" r="-181" b="-52355"/>
                 </a:stretch>
               </a:blipFill>
               <a:ln w="9525">
@@ -19436,7 +19453,7 @@
       </mc:AlternateContent>
       <p:sp>
         <p:nvSpPr>
-          <p:cNvPr id="505" name="RS_Classification_Standard"/>
+          <p:cNvPr id="512" name="RS_Classification_Standard"/>
           <p:cNvSpPr txBox="1"/>
           <p:nvPr/>
         </p:nvSpPr>
@@ -20566,7 +20583,7 @@
       </p:sp>
       <p:sp>
         <p:nvSpPr>
-          <p:cNvPr id="218" name="RS_Classification_Standard"/>
+          <p:cNvPr id="225" name="RS_Classification_Standard"/>
           <p:cNvSpPr txBox="1"/>
           <p:nvPr/>
         </p:nvSpPr>
@@ -20827,7 +20844,7 @@
       </p:sp>
       <p:sp>
         <p:nvSpPr>
-          <p:cNvPr id="87" name="RS_Classification_Standard"/>
+          <p:cNvPr id="94" name="RS_Classification_Standard"/>
           <p:cNvSpPr txBox="1"/>
           <p:nvPr/>
         </p:nvSpPr>
@@ -21229,7 +21246,7 @@
       </p:sp>
       <p:sp>
         <p:nvSpPr>
-          <p:cNvPr id="311" name="RS_Classification_Standard"/>
+          <p:cNvPr id="318" name="RS_Classification_Standard"/>
           <p:cNvSpPr txBox="1"/>
           <p:nvPr/>
         </p:nvSpPr>
@@ -21797,7 +21814,7 @@
       </mc:AlternateContent>
       <p:sp>
         <p:nvSpPr>
-          <p:cNvPr id="345" name="RS_Classification_Standard"/>
+          <p:cNvPr id="352" name="RS_Classification_Standard"/>
           <p:cNvSpPr txBox="1"/>
           <p:nvPr/>
         </p:nvSpPr>
@@ -22884,7 +22901,7 @@
       </p:cxnSp>
       <p:sp>
         <p:nvSpPr>
-          <p:cNvPr id="343" name="RS_Classification_Standard"/>
+          <p:cNvPr id="359" name="RS_Classification_Standard"/>
           <p:cNvSpPr txBox="1"/>
           <p:nvPr/>
         </p:nvSpPr>
@@ -23229,7 +23246,7 @@
       </p:pic>
       <p:sp>
         <p:nvSpPr>
-          <p:cNvPr id="216" name="RS_Classification_Standard"/>
+          <p:cNvPr id="223" name="RS_Classification_Standard"/>
           <p:cNvSpPr txBox="1"/>
           <p:nvPr/>
         </p:nvSpPr>
@@ -23532,7 +23549,7 @@
       </p:sp>
       <p:sp>
         <p:nvSpPr>
-          <p:cNvPr id="88" name="RS_Classification_Standard"/>
+          <p:cNvPr id="95" name="RS_Classification_Standard"/>
           <p:cNvSpPr txBox="1"/>
           <p:nvPr/>
         </p:nvSpPr>
@@ -24749,7 +24766,7 @@
       </p:grpSp>
       <p:sp>
         <p:nvSpPr>
-          <p:cNvPr id="713" name="RS_Classification_Standard"/>
+          <p:cNvPr id="720" name="RS_Classification_Standard"/>
           <p:cNvSpPr txBox="1"/>
           <p:nvPr/>
         </p:nvSpPr>
@@ -26264,7 +26281,7 @@
       </p:sp>
       <p:sp>
         <p:nvSpPr>
-          <p:cNvPr id="128" name="RS_Classification_Standard"/>
+          <p:cNvPr id="135" name="RS_Classification_Standard"/>
           <p:cNvSpPr txBox="1"/>
           <p:nvPr/>
         </p:nvSpPr>
@@ -27212,7 +27229,7 @@
       </p:sp>
       <p:sp>
         <p:nvSpPr>
-          <p:cNvPr id="571" name="RS_Classification_Standard"/>
+          <p:cNvPr id="578" name="RS_Classification_Standard"/>
           <p:cNvSpPr txBox="1"/>
           <p:nvPr/>
         </p:nvSpPr>
@@ -29466,7 +29483,7 @@
       </p:sp>
       <p:sp>
         <p:nvSpPr>
-          <p:cNvPr id="101" name="RS_Classification_Standard"/>
+          <p:cNvPr id="108" name="RS_Classification_Standard"/>
           <p:cNvSpPr txBox="1"/>
           <p:nvPr/>
         </p:nvSpPr>
@@ -29714,7 +29731,7 @@
       </p:pic>
       <p:sp>
         <p:nvSpPr>
-          <p:cNvPr id="664" name="RS_Classification_Standard"/>
+          <p:cNvPr id="671" name="RS_Classification_Standard"/>
           <p:cNvSpPr txBox="1"/>
           <p:nvPr/>
         </p:nvSpPr>
@@ -30166,42 +30183,6 @@
           </a:p>
         </p:txBody>
       </p:sp>
-      <p:pic>
-        <p:nvPicPr>
-          <p:cNvPr id="25" name="Picture 24">
-            <a:extLst>
-              <a:ext uri="{FF2B5EF4-FFF2-40B4-BE49-F238E27FC236}">
-                <a16:creationId xmlns:a16="http://schemas.microsoft.com/office/drawing/2014/main" id="{05FA51C4-D92B-4C3B-A20C-4FE504B35AF6}"/>
-              </a:ext>
-            </a:extLst>
-          </p:cNvPr>
-          <p:cNvPicPr>
-            <a:picLocks noChangeAspect="1"/>
-          </p:cNvPicPr>
-          <p:nvPr/>
-        </p:nvPicPr>
-        <p:blipFill>
-          <a:blip r:embed="rId3">
-            <a:extLst>
-              <a:ext uri="{28A0092B-C50C-407E-A947-70E740481C1C}">
-                <a14:useLocalDpi xmlns:a14="http://schemas.microsoft.com/office/drawing/2010/main" val="0"/>
-              </a:ext>
-            </a:extLst>
-          </a:blip>
-          <a:stretch>
-            <a:fillRect/>
-          </a:stretch>
-        </p:blipFill>
-        <p:spPr>
-          <a:xfrm>
-            <a:off x="75582" y="4466188"/>
-            <a:ext cx="3528020" cy="1425737"/>
-          </a:xfrm>
-          <a:prstGeom prst="rect">
-            <a:avLst/>
-          </a:prstGeom>
-        </p:spPr>
-      </p:pic>
       <mc:AlternateContent xmlns:mc="http://schemas.openxmlformats.org/markup-compatibility/2006">
         <mc:Choice xmlns:a14="http://schemas.microsoft.com/office/drawing/2010/main" Requires="a14">
           <p:sp>
@@ -30281,7 +30262,7 @@
                 <a:avLst/>
               </a:prstGeom>
               <a:blipFill>
-                <a:blip r:embed="rId4"/>
+                <a:blip r:embed="rId3"/>
                 <a:stretch>
                   <a:fillRect t="-4444" b="-15556"/>
                 </a:stretch>
@@ -30640,9 +30621,115 @@
           </a:p>
         </p:txBody>
       </p:sp>
+      <p:grpSp>
+        <p:nvGrpSpPr>
+          <p:cNvPr id="509" name="Group 508"/>
+          <p:cNvGrpSpPr/>
+          <p:nvPr/>
+        </p:nvGrpSpPr>
+        <p:grpSpPr>
+          <a:xfrm>
+            <a:off x="75582" y="4507504"/>
+            <a:ext cx="3528020" cy="1425737"/>
+            <a:chOff x="75582" y="4507504"/>
+            <a:chExt cx="3528020" cy="1425737"/>
+          </a:xfrm>
+        </p:grpSpPr>
+        <p:pic>
+          <p:nvPicPr>
+            <p:cNvPr id="25" name="Picture 24">
+              <a:extLst>
+                <a:ext uri="{FF2B5EF4-FFF2-40B4-BE49-F238E27FC236}">
+                  <a16:creationId xmlns:a16="http://schemas.microsoft.com/office/drawing/2014/main" id="{05FA51C4-D92B-4C3B-A20C-4FE504B35AF6}"/>
+                </a:ext>
+              </a:extLst>
+            </p:cNvPr>
+            <p:cNvPicPr>
+              <a:picLocks noChangeAspect="1"/>
+            </p:cNvPicPr>
+            <p:nvPr/>
+          </p:nvPicPr>
+          <p:blipFill>
+            <a:blip r:embed="rId6">
+              <a:extLst>
+                <a:ext uri="{28A0092B-C50C-407E-A947-70E740481C1C}">
+                  <a14:useLocalDpi xmlns:a14="http://schemas.microsoft.com/office/drawing/2010/main" val="0"/>
+                </a:ext>
+              </a:extLst>
+            </a:blip>
+            <a:stretch>
+              <a:fillRect/>
+            </a:stretch>
+          </p:blipFill>
+          <p:spPr>
+            <a:xfrm>
+              <a:off x="75582" y="4507504"/>
+              <a:ext cx="3528020" cy="1425737"/>
+            </a:xfrm>
+            <a:prstGeom prst="rect">
+              <a:avLst/>
+            </a:prstGeom>
+          </p:spPr>
+        </p:pic>
+        <p:sp>
+          <p:nvSpPr>
+            <p:cNvPr id="508" name="Oval 507"/>
+            <p:cNvSpPr/>
+            <p:nvPr/>
+          </p:nvSpPr>
+          <p:spPr>
+            <a:xfrm>
+              <a:off x="2965038" y="4725620"/>
+              <a:ext cx="116300" cy="115461"/>
+            </a:xfrm>
+            <a:prstGeom prst="ellipse">
+              <a:avLst/>
+            </a:prstGeom>
+            <a:noFill/>
+            <a:ln w="12700">
+              <a:solidFill>
+                <a:schemeClr val="tx1"/>
+              </a:solidFill>
+            </a:ln>
+          </p:spPr>
+          <p:style>
+            <a:lnRef idx="2">
+              <a:schemeClr val="accent1">
+                <a:shade val="50000"/>
+              </a:schemeClr>
+            </a:lnRef>
+            <a:fillRef idx="1">
+              <a:schemeClr val="accent1"/>
+            </a:fillRef>
+            <a:effectRef idx="0">
+              <a:schemeClr val="accent1"/>
+            </a:effectRef>
+            <a:fontRef idx="minor">
+              <a:schemeClr val="lt1"/>
+            </a:fontRef>
+          </p:style>
+          <p:txBody>
+            <a:bodyPr rot="0" spcFirstLastPara="0" vertOverflow="overflow" horzOverflow="overflow" vert="horz" wrap="square" lIns="91440" tIns="45720" rIns="91440" bIns="45720" numCol="1" spcCol="0" rtlCol="0" fromWordArt="0" anchor="t" anchorCtr="0" forceAA="0" compatLnSpc="1">
+              <a:prstTxWarp prst="textNoShape">
+                <a:avLst/>
+              </a:prstTxWarp>
+              <a:noAutofit/>
+            </a:bodyPr>
+            <a:lstStyle/>
+            <a:p>
+              <a:pPr algn="ctr">
+                <a:lnSpc>
+                  <a:spcPct val="114000"/>
+                </a:lnSpc>
+              </a:pPr>
+              <a:endParaRPr lang="en-US" dirty="0" smtClean="0"/>
+            </a:p>
+          </p:txBody>
+        </p:sp>
+      </p:grpSp>
       <p:sp>
         <p:nvSpPr>
-          <p:cNvPr id="507" name="RS_Classification_Standard"/>
+          <p:cNvPr id="548" name="RS_Classification_Standard"/>
           <p:cNvSpPr txBox="1"/>
           <p:nvPr/>
         </p:nvSpPr>
@@ -30733,8 +30820,8 @@
           </a:prstGeom>
         </p:spPr>
       </p:pic>
-      <mc:AlternateContent xmlns:mc="http://schemas.openxmlformats.org/markup-compatibility/2006" xmlns:a14="http://schemas.microsoft.com/office/drawing/2010/main">
-        <mc:Choice Requires="a14">
+      <mc:AlternateContent xmlns:mc="http://schemas.openxmlformats.org/markup-compatibility/2006">
+        <mc:Choice xmlns:a14="http://schemas.microsoft.com/office/drawing/2010/main" Requires="a14">
           <p:sp>
             <p:nvSpPr>
               <p:cNvPr id="2" name="Content Placeholder 1"/>
@@ -30760,7 +30847,7 @@
                   <a:buChar char="•"/>
                 </a:pPr>
                 <a:r>
-                  <a:rPr lang="en-US" dirty="0">
+                  <a:rPr lang="en-US" dirty="0" smtClean="0">
                     <a:latin typeface="Simplified Arabic Fixed" panose="02070309020205020404" pitchFamily="49" charset="-78"/>
                     <a:cs typeface="Simplified Arabic Fixed" panose="02070309020205020404" pitchFamily="49" charset="-78"/>
                   </a:rPr>
@@ -31648,49 +31735,36 @@
                 </a14:m>
                 <a:r>
                   <a:rPr lang="en-US" dirty="0"/>
-                  <a:t> </a:t>
+                  <a:t>  </a:t>
                 </a:r>
-                <a14:m>
-                  <m:oMath xmlns:m="http://schemas.openxmlformats.org/officeDocument/2006/math">
-                    <m:r>
-                      <a:rPr lang="en-US" i="1">
-                        <a:solidFill>
-                          <a:prstClr val="black"/>
-                        </a:solidFill>
-                        <a:latin typeface="Cambria Math" panose="02040503050406030204" pitchFamily="18" charset="0"/>
-                        <a:ea typeface="Cambria Math" panose="02040503050406030204" pitchFamily="18" charset="0"/>
-                      </a:rPr>
-                      <m:t>∕∕</m:t>
-                    </m:r>
-                    <m:r>
-                      <a:rPr lang="en-US" b="0" i="1" smtClean="0">
-                        <a:solidFill>
-                          <a:prstClr val="black"/>
-                        </a:solidFill>
-                        <a:latin typeface="Cambria Math" panose="02040503050406030204" pitchFamily="18" charset="0"/>
-                      </a:rPr>
-                      <m:t>𝑆𝑢𝑝𝑒𝑟𝑓𝑙𝑢𝑜𝑢𝑠</m:t>
-                    </m:r>
-                    <m:r>
-                      <a:rPr lang="en-US" i="1">
-                        <a:solidFill>
-                          <a:prstClr val="black"/>
-                        </a:solidFill>
-                        <a:latin typeface="Cambria Math" panose="02040503050406030204" pitchFamily="18" charset="0"/>
-                      </a:rPr>
-                      <m:t> </m:t>
-                    </m:r>
-                    <m:r>
-                      <a:rPr lang="en-US" i="1">
-                        <a:solidFill>
-                          <a:prstClr val="black"/>
-                        </a:solidFill>
-                        <a:latin typeface="Cambria Math" panose="02040503050406030204" pitchFamily="18" charset="0"/>
-                      </a:rPr>
-                      <m:t>𝑐𝑜𝑝𝑦𝑖𝑛𝑔</m:t>
-                    </m:r>
-                  </m:oMath>
-                </a14:m>
+                <a:r>
+                  <a:rPr lang="en-US" dirty="0" smtClean="0">
+                    <a:solidFill>
+                      <a:prstClr val="black"/>
+                    </a:solidFill>
+                    <a:latin typeface="+mj-lt"/>
+                    <a:ea typeface="Cambria Math" panose="02040503050406030204" pitchFamily="18" charset="0"/>
+                  </a:rPr>
+                  <a:t>//</a:t>
+                </a:r>
+                <a:r>
+                  <a:rPr lang="en-US" b="0" i="0" dirty="0" smtClean="0">
+                    <a:solidFill>
+                      <a:prstClr val="black"/>
+                    </a:solidFill>
+                    <a:latin typeface="+mj-lt"/>
+                  </a:rPr>
+                  <a:t>Superfluous</a:t>
+                </a:r>
+                <a:r>
+                  <a:rPr lang="en-US" i="0" dirty="0" smtClean="0">
+                    <a:solidFill>
+                      <a:prstClr val="black"/>
+                    </a:solidFill>
+                    <a:latin typeface="+mj-lt"/>
+                  </a:rPr>
+                  <a:t> copying</a:t>
+                </a:r>
                 <a:endParaRPr lang="en-US" dirty="0">
                   <a:solidFill>
                     <a:prstClr val="black"/>
@@ -31706,7 +31780,7 @@
             </p:txBody>
           </p:sp>
         </mc:Choice>
-        <mc:Fallback xmlns="">
+        <mc:Fallback>
           <p:sp>
             <p:nvSpPr>
               <p:cNvPr id="2" name="Content Placeholder 1"/>
@@ -32194,7 +32268,7 @@
       </mc:AlternateContent>
       <p:sp>
         <p:nvSpPr>
-          <p:cNvPr id="571" name="RS_Classification_Standard"/>
+          <p:cNvPr id="132" name="RS_Classification_Standard"/>
           <p:cNvSpPr txBox="1"/>
           <p:nvPr/>
         </p:nvSpPr>
@@ -32533,7 +32607,7 @@
       </mc:AlternateContent>
       <p:sp>
         <p:nvSpPr>
-          <p:cNvPr id="633" name="RS_Classification_Standard"/>
+          <p:cNvPr id="640" name="RS_Classification_Standard"/>
           <p:cNvSpPr txBox="1"/>
           <p:nvPr/>
         </p:nvSpPr>
@@ -32599,8 +32673,8 @@
           <a:chExt cx="0" cy="0"/>
         </a:xfrm>
       </p:grpSpPr>
-      <mc:AlternateContent xmlns:mc="http://schemas.openxmlformats.org/markup-compatibility/2006" xmlns:a14="http://schemas.microsoft.com/office/drawing/2010/main">
-        <mc:Choice Requires="a14">
+      <mc:AlternateContent xmlns:mc="http://schemas.openxmlformats.org/markup-compatibility/2006">
+        <mc:Choice xmlns:a14="http://schemas.microsoft.com/office/drawing/2010/main" Requires="a14">
           <p:sp>
             <p:nvSpPr>
               <p:cNvPr id="2" name="Content Placeholder 1"/>
@@ -32818,13 +32892,16 @@
                       <m:t>=</m:t>
                     </m:r>
                     <m:r>
-                      <a:rPr lang="en-US" i="1" dirty="0">
+                      <m:rPr>
+                        <m:sty m:val="p"/>
+                      </m:rPr>
+                      <a:rPr lang="en-US" i="0" dirty="0">
                         <a:solidFill>
                           <a:prstClr val="black"/>
                         </a:solidFill>
                         <a:latin typeface="Cambria Math" panose="02040503050406030204" pitchFamily="18" charset="0"/>
                       </a:rPr>
-                      <m:t>𝑠𝑖𝑔𝑛</m:t>
+                      <m:t>sign</m:t>
                     </m:r>
                     <m:d>
                       <m:dPr>
@@ -32911,13 +32988,16 @@
                       <m:t>∗</m:t>
                     </m:r>
                     <m:r>
-                      <a:rPr lang="en-US" i="1" dirty="0">
+                      <m:rPr>
+                        <m:sty m:val="p"/>
+                      </m:rPr>
+                      <a:rPr lang="en-US" i="0" dirty="0">
                         <a:solidFill>
                           <a:prstClr val="black"/>
                         </a:solidFill>
                         <a:latin typeface="Cambria Math" panose="02040503050406030204" pitchFamily="18" charset="0"/>
                       </a:rPr>
-                      <m:t>𝑠𝑖𝑔𝑛</m:t>
+                      <m:t>sign</m:t>
                     </m:r>
                     <m:r>
                       <a:rPr lang="en-US" i="1" dirty="0">
@@ -34361,7 +34441,7 @@
             </p:txBody>
           </p:sp>
         </mc:Choice>
-        <mc:Fallback xmlns="">
+        <mc:Fallback>
           <p:sp>
             <p:nvSpPr>
               <p:cNvPr id="2" name="Content Placeholder 1"/>
@@ -34586,7 +34666,7 @@
       </p:sp>
       <p:sp>
         <p:nvSpPr>
-          <p:cNvPr id="90" name="RS_Classification_Standard"/>
+          <p:cNvPr id="97" name="RS_Classification_Standard"/>
           <p:cNvSpPr txBox="1"/>
           <p:nvPr/>
         </p:nvSpPr>
@@ -35055,7 +35135,7 @@
       </p:sp>
       <p:sp>
         <p:nvSpPr>
-          <p:cNvPr id="600" name="RS_Classification_Standard"/>
+          <p:cNvPr id="163" name="RS_Classification_Standard"/>
           <p:cNvSpPr txBox="1"/>
           <p:nvPr/>
         </p:nvSpPr>
@@ -35511,7 +35591,7 @@
       </p:pic>
       <p:sp>
         <p:nvSpPr>
-          <p:cNvPr id="58" name="RS_Classification_Standard"/>
+          <p:cNvPr id="417" name="RS_Classification_Standard"/>
           <p:cNvSpPr txBox="1"/>
           <p:nvPr/>
         </p:nvSpPr>

</xml_diff>

<commit_message>
Added cover page and grammar correction from grammarly
</commit_message>
<xml_diff>
--- a/final_presentation/finalPpt1.4.pptx
+++ b/final_presentation/finalPpt1.4.pptx
@@ -317,7 +317,7 @@
               <a:pPr>
                 <a:defRPr/>
               </a:pPr>
-              <a:t>19/11/2018</a:t>
+              <a:t>20/11/2018</a:t>
             </a:fld>
             <a:endParaRPr lang="en-GB" dirty="0"/>
           </a:p>
@@ -536,7 +536,7 @@
               <a:pPr>
                 <a:defRPr/>
               </a:pPr>
-              <a:t>19/11/2018</a:t>
+              <a:t>20/11/2018</a:t>
             </a:fld>
             <a:endParaRPr lang="en-GB"/>
           </a:p>
@@ -2311,10 +2311,6 @@
             <a:br>
               <a:rPr lang="de-DE" noProof="0" dirty="0"/>
             </a:br>
-            <a:r>
-              <a:rPr lang="de-DE" noProof="0" dirty="0"/>
-              <a:t/>
-            </a:r>
             <a:br>
               <a:rPr lang="de-DE" noProof="0" dirty="0"/>
             </a:br>
@@ -2527,10 +2523,6 @@
             <a:br>
               <a:rPr lang="de-DE" noProof="0" dirty="0"/>
             </a:br>
-            <a:r>
-              <a:rPr lang="de-DE" noProof="0" dirty="0"/>
-              <a:t/>
-            </a:r>
             <a:br>
               <a:rPr lang="de-DE" noProof="0" dirty="0"/>
             </a:br>
@@ -8138,7 +8130,7 @@
         <p:spPr>
           <a:xfrm>
             <a:off x="317935" y="1199339"/>
-            <a:ext cx="8508999" cy="820738"/>
+            <a:ext cx="8508999" cy="1198533"/>
           </a:xfrm>
         </p:spPr>
         <p:txBody>
@@ -8151,7 +8143,7 @@
                   <a:schemeClr val="tx2"/>
                 </a:solidFill>
               </a:rPr>
-              <a:t>Polar FEC chain development in software for 5G</a:t>
+              <a:t>Low Latency Polar FEC Chain Development in Software for 5G</a:t>
             </a:r>
             <a:br>
               <a:rPr lang="en-US" dirty="0">
@@ -8198,7 +8190,7 @@
           <a:p>
             <a:r>
               <a:rPr lang="de-DE" dirty="0"/>
-              <a:t>Yadhunandana Kumaraiah (Yadhu)</a:t>
+              <a:t>Yadhunandana R. Kumaraiah (Yadhu)</a:t>
             </a:r>
           </a:p>
           <a:p>
@@ -8295,7 +8287,7 @@
           </a:bodyPr>
           <a:lstStyle/>
           <a:p>
-            <a:endParaRPr lang="en-US" sz="1100" b="1" kern="900" spc="100" dirty="0" err="1" smtClean="0">
+            <a:endParaRPr lang="en-US" sz="1100" b="1" kern="900" spc="100" dirty="0" err="1">
               <a:solidFill>
                 <a:srgbClr val="000000"/>
               </a:solidFill>
@@ -8547,7 +8539,7 @@
           </a:bodyPr>
           <a:lstStyle/>
           <a:p>
-            <a:endParaRPr lang="en-US" sz="1100" b="1" kern="900" spc="100" dirty="0" err="1" smtClean="0">
+            <a:endParaRPr lang="en-US" sz="1100" b="1" kern="900" spc="100" dirty="0" err="1">
               <a:solidFill>
                 <a:srgbClr val="000000"/>
               </a:solidFill>
@@ -8803,7 +8795,7 @@
           </a:bodyPr>
           <a:lstStyle/>
           <a:p>
-            <a:endParaRPr lang="en-US" sz="1100" b="1" kern="900" spc="100" dirty="0" err="1" smtClean="0">
+            <a:endParaRPr lang="en-US" sz="1100" b="1" kern="900" spc="100" dirty="0" err="1">
               <a:solidFill>
                 <a:srgbClr val="000000"/>
               </a:solidFill>
@@ -8840,8 +8832,8 @@
           <a:chExt cx="0" cy="0"/>
         </a:xfrm>
       </p:grpSpPr>
-      <mc:AlternateContent xmlns:mc="http://schemas.openxmlformats.org/markup-compatibility/2006">
-        <mc:Choice xmlns:a14="http://schemas.microsoft.com/office/drawing/2010/main" Requires="a14">
+      <mc:AlternateContent xmlns:mc="http://schemas.openxmlformats.org/markup-compatibility/2006" xmlns:a14="http://schemas.microsoft.com/office/drawing/2010/main">
+        <mc:Choice Requires="a14">
           <p:sp>
             <p:nvSpPr>
               <p:cNvPr id="2" name="Content Placeholder 1"/>
@@ -8867,12 +8859,8 @@
                   <a:buChar char="•"/>
                 </a:pPr>
                 <a:r>
-                  <a:rPr lang="en-US" dirty="0" smtClean="0"/>
-                  <a:t>Reliable </a:t>
-                </a:r>
-                <a:r>
                   <a:rPr lang="en-US" dirty="0"/>
-                  <a:t>bit indices need to be selected by considering effect of rate matching on reliability values.</a:t>
+                  <a:t>Reliable bit indices need to be selected by considering effect of rate matching on reliability values.</a:t>
                 </a:r>
               </a:p>
               <a:p>
@@ -8962,7 +8950,7 @@
             </p:txBody>
           </p:sp>
         </mc:Choice>
-        <mc:Fallback>
+        <mc:Fallback xmlns="">
           <p:sp>
             <p:nvSpPr>
               <p:cNvPr id="2" name="Content Placeholder 1"/>
@@ -9111,7 +9099,7 @@
           </a:bodyPr>
           <a:lstStyle/>
           <a:p>
-            <a:endParaRPr lang="en-US" sz="1100" b="1" kern="900" spc="100" dirty="0" err="1" smtClean="0">
+            <a:endParaRPr lang="en-US" sz="1100" b="1" kern="900" spc="100" dirty="0" err="1">
               <a:solidFill>
                 <a:srgbClr val="000000"/>
               </a:solidFill>
@@ -9133,13 +9121,6 @@
   <p:clrMapOvr>
     <a:masterClrMapping/>
   </p:clrMapOvr>
-  <p:timing>
-    <p:tnLst>
-      <p:par>
-        <p:cTn id="1" dur="indefinite" restart="never" nodeType="tmRoot"/>
-      </p:par>
-    </p:tnLst>
-  </p:timing>
 </p:sld>
 </file>
 
@@ -9160,8 +9141,8 @@
           <a:chExt cx="0" cy="0"/>
         </a:xfrm>
       </p:grpSpPr>
-      <mc:AlternateContent xmlns:mc="http://schemas.openxmlformats.org/markup-compatibility/2006">
-        <mc:Choice xmlns:a14="http://schemas.microsoft.com/office/drawing/2010/main" Requires="a14">
+      <mc:AlternateContent xmlns:mc="http://schemas.openxmlformats.org/markup-compatibility/2006" xmlns:a14="http://schemas.microsoft.com/office/drawing/2010/main">
+        <mc:Choice Requires="a14">
           <p:sp>
             <p:nvSpPr>
               <p:cNvPr id="2" name="Content Placeholder 1"/>
@@ -9187,7 +9168,7 @@
                   <a:buChar char="•"/>
                 </a:pPr>
                 <a:r>
-                  <a:rPr lang="en-US" dirty="0" smtClean="0">
+                  <a:rPr lang="en-US" dirty="0">
                     <a:solidFill>
                       <a:schemeClr val="bg2"/>
                     </a:solidFill>
@@ -9204,12 +9185,8 @@
                   <a:buChar char="Ø"/>
                 </a:pPr>
                 <a:r>
-                  <a:rPr lang="en-US" dirty="0" smtClean="0"/>
-                  <a:t>Intelligent </a:t>
-                </a:r>
-                <a:r>
                   <a:rPr lang="en-US" dirty="0"/>
-                  <a:t>memory layout design for </a:t>
+                  <a:t>Intelligent memory layout design for </a:t>
                 </a:r>
                 <a14:m>
                   <m:oMath xmlns:m="http://schemas.openxmlformats.org/officeDocument/2006/math">
@@ -10108,7 +10085,7 @@
                     </m:r>
                   </m:oMath>
                 </a14:m>
-                <a:endParaRPr lang="en-US" dirty="0" smtClean="0"/>
+                <a:endParaRPr lang="en-US" dirty="0"/>
               </a:p>
               <a:p>
                 <a:pPr marL="285750" indent="-285750">
@@ -10116,20 +10093,12 @@
                   <a:buChar char="•"/>
                 </a:pPr>
                 <a:r>
-                  <a:rPr lang="en-US" dirty="0" smtClean="0">
-                    <a:solidFill>
-                      <a:schemeClr val="bg2"/>
-                    </a:solidFill>
-                  </a:rPr>
-                  <a:t>Exploit </a:t>
-                </a:r>
-                <a:r>
                   <a:rPr lang="en-US" dirty="0">
                     <a:solidFill>
                       <a:schemeClr val="bg2"/>
                     </a:solidFill>
                   </a:rPr>
-                  <a:t>data parallelism: </a:t>
+                  <a:t>Exploit data parallelism: </a:t>
                 </a:r>
                 <a:endParaRPr lang="en-US" dirty="0"/>
               </a:p>
@@ -10149,46 +10118,9 @@
                   <a:buChar char="Ø"/>
                 </a:pPr>
                 <a:r>
-                  <a:rPr lang="en-US" dirty="0" smtClean="0"/>
-                  <a:t>Multiple bits </a:t>
+                  <a:rPr lang="en-US" dirty="0"/>
+                  <a:t>Multiple bits processed in parallel by packing multiple bits to single integer. E.g. int8 = 8 info bits, int64 = 64 info bits.</a:t>
                 </a:r>
-                <a:r>
-                  <a:rPr lang="en-US" dirty="0" smtClean="0"/>
-                  <a:t>processed </a:t>
-                </a:r>
-                <a:r>
-                  <a:rPr lang="en-US" dirty="0"/>
-                  <a:t>in parallel by packing multiple </a:t>
-                </a:r>
-                <a:r>
-                  <a:rPr lang="en-US" dirty="0" smtClean="0"/>
-                  <a:t>bits </a:t>
-                </a:r>
-                <a:r>
-                  <a:rPr lang="en-US" dirty="0"/>
-                  <a:t>to single </a:t>
-                </a:r>
-                <a:r>
-                  <a:rPr lang="en-US" dirty="0" smtClean="0"/>
-                  <a:t>integer. E.g. int8 = </a:t>
-                </a:r>
-                <a:r>
-                  <a:rPr lang="en-US" dirty="0"/>
-                  <a:t>8 info bits, </a:t>
-                </a:r>
-                <a:r>
-                  <a:rPr lang="en-US" dirty="0" smtClean="0"/>
-                  <a:t>int64 = </a:t>
-                </a:r>
-                <a:r>
-                  <a:rPr lang="en-US" dirty="0"/>
-                  <a:t>64 info bits</a:t>
-                </a:r>
-                <a:r>
-                  <a:rPr lang="en-US" dirty="0" smtClean="0"/>
-                  <a:t>.</a:t>
-                </a:r>
-                <a:endParaRPr lang="en-US" dirty="0"/>
               </a:p>
               <a:p>
                 <a:pPr marL="461963" lvl="1" indent="-285750">
@@ -10196,20 +10128,8 @@
                   <a:buChar char="Ø"/>
                 </a:pPr>
                 <a:r>
-                  <a:rPr lang="en-US" dirty="0" smtClean="0"/>
-                  <a:t>SIMD registers are </a:t>
-                </a:r>
-                <a:r>
                   <a:rPr lang="en-US" dirty="0"/>
-                  <a:t>256 bits </a:t>
-                </a:r>
-                <a:r>
-                  <a:rPr lang="en-US" dirty="0" smtClean="0"/>
-                  <a:t>wide, Resulting </a:t>
-                </a:r>
-                <a:r>
-                  <a:rPr lang="en-US" dirty="0"/>
-                  <a:t>in a parallelism factor </a:t>
+                  <a:t>SIMD registers are 256 bits wide, Resulting in a parallelism factor </a:t>
                 </a:r>
                 <a14:m>
                   <m:oMath xmlns:m="http://schemas.openxmlformats.org/officeDocument/2006/math">
@@ -10228,15 +10148,14 @@
                   </m:oMath>
                 </a14:m>
                 <a:r>
-                  <a:rPr lang="en-US" dirty="0" smtClean="0"/>
+                  <a:rPr lang="en-US" dirty="0"/>
                   <a:t>.</a:t>
                 </a:r>
-                <a:endParaRPr lang="en-US" dirty="0"/>
               </a:p>
             </p:txBody>
           </p:sp>
         </mc:Choice>
-        <mc:Fallback>
+        <mc:Fallback xmlns="">
           <p:sp>
             <p:nvSpPr>
               <p:cNvPr id="2" name="Content Placeholder 1"/>
@@ -14480,7 +14399,7 @@
           </a:bodyPr>
           <a:lstStyle/>
           <a:p>
-            <a:endParaRPr lang="en-US" sz="1100" b="1" kern="900" spc="100" dirty="0" err="1" smtClean="0">
+            <a:endParaRPr lang="en-US" sz="1100" b="1" kern="900" spc="100" dirty="0" err="1">
               <a:solidFill>
                 <a:srgbClr val="000000"/>
               </a:solidFill>
@@ -14502,13 +14421,6 @@
   <p:clrMapOvr>
     <a:masterClrMapping/>
   </p:clrMapOvr>
-  <p:timing>
-    <p:tnLst>
-      <p:par>
-        <p:cTn id="1" dur="indefinite" restart="never" nodeType="tmRoot"/>
-      </p:par>
-    </p:tnLst>
-  </p:timing>
 </p:sld>
 </file>
 
@@ -14817,8 +14729,8 @@
           </p:txBody>
         </p:sp>
       </p:grpSp>
-      <mc:AlternateContent xmlns:mc="http://schemas.openxmlformats.org/markup-compatibility/2006">
-        <mc:Choice xmlns:a14="http://schemas.microsoft.com/office/drawing/2010/main" Requires="a14">
+      <mc:AlternateContent xmlns:mc="http://schemas.openxmlformats.org/markup-compatibility/2006" xmlns:a14="http://schemas.microsoft.com/office/drawing/2010/main">
+        <mc:Choice Requires="a14">
           <p:sp>
             <p:nvSpPr>
               <p:cNvPr id="2" name="Content Placeholder 1"/>
@@ -14844,7 +14756,7 @@
                   <a:buChar char="•"/>
                 </a:pPr>
                 <a:r>
-                  <a:rPr lang="en-US" dirty="0" smtClean="0"/>
+                  <a:rPr lang="en-US" dirty="0"/>
                   <a:t>Plain encoder implementation traverses till the end of tree. E.g.: </a:t>
                 </a:r>
                 <a14:m>
@@ -14879,13 +14791,8 @@
                 </a14:m>
                 <a:r>
                   <a:rPr lang="en-US" dirty="0"/>
-                  <a:t> </a:t>
+                  <a:t> nodes.</a:t>
                 </a:r>
-                <a:r>
-                  <a:rPr lang="en-US" dirty="0" smtClean="0"/>
-                  <a:t>nodes.</a:t>
-                </a:r>
-                <a:endParaRPr lang="en-US" dirty="0"/>
               </a:p>
               <a:p>
                 <a:pPr marL="285750" indent="-285750">
@@ -14894,23 +14801,7 @@
                 </a:pPr>
                 <a:r>
                   <a:rPr lang="en-US" dirty="0"/>
-                  <a:t>Pruning </a:t>
-                </a:r>
-                <a:r>
-                  <a:rPr lang="en-US" dirty="0" smtClean="0"/>
-                  <a:t>is done </a:t>
-                </a:r>
-                <a:r>
-                  <a:rPr lang="en-US" dirty="0" smtClean="0"/>
-                  <a:t>by </a:t>
-                </a:r>
-                <a:r>
-                  <a:rPr lang="en-US" dirty="0"/>
-                  <a:t>building a lookup table and stopping encoding </a:t>
-                </a:r>
-                <a:r>
-                  <a:rPr lang="en-US" dirty="0" smtClean="0"/>
-                  <a:t>at </a:t>
+                  <a:t>Pruning is done by building a lookup table and stopping encoding at </a:t>
                 </a:r>
                 <a14:m>
                   <m:oMath xmlns:m="http://schemas.openxmlformats.org/officeDocument/2006/math">
@@ -14970,12 +14861,8 @@
                   </m:oMath>
                 </a14:m>
                 <a:r>
-                  <a:rPr lang="en-US" dirty="0" smtClean="0"/>
-                  <a:t> level, </a:t>
-                </a:r>
-                <a:r>
                   <a:rPr lang="en-US" dirty="0"/>
-                  <a:t>i.e. </a:t>
+                  <a:t> level, i.e. </a:t>
                 </a:r>
                 <a:r>
                   <a:rPr lang="en-US" dirty="0">
@@ -14994,16 +14881,8 @@
                   <a:buChar char="•"/>
                 </a:pPr>
                 <a:r>
-                  <a:rPr lang="en-US" dirty="0" smtClean="0"/>
-                  <a:t>Number </a:t>
-                </a:r>
-                <a:r>
                   <a:rPr lang="en-US" dirty="0"/>
-                  <a:t>of nodes </a:t>
-                </a:r>
-                <a:r>
-                  <a:rPr lang="en-US" dirty="0" smtClean="0"/>
-                  <a:t>reduced to </a:t>
+                  <a:t>Number of nodes reduced to </a:t>
                 </a:r>
                 <a:r>
                   <a:rPr lang="en-US" dirty="0">
@@ -15023,15 +14902,7 @@
                 </a:r>
                 <a:r>
                   <a:rPr lang="en-US" dirty="0"/>
-                  <a:t> hence significantly </a:t>
-                </a:r>
-                <a:r>
-                  <a:rPr lang="en-US" dirty="0" smtClean="0"/>
-                  <a:t>reducing </a:t>
-                </a:r>
-                <a:r>
-                  <a:rPr lang="en-US" dirty="0"/>
-                  <a:t>the latency.</a:t>
+                  <a:t> hence significantly reducing the latency.</a:t>
                 </a:r>
               </a:p>
               <a:p>
@@ -15041,21 +14912,8 @@
                 </a:pPr>
                 <a:r>
                   <a:rPr lang="en-US" dirty="0"/>
-                  <a:t>This optimization </a:t>
+                  <a:t>This optimization is applicable for hardware implementations as well.</a:t>
                 </a:r>
-                <a:r>
-                  <a:rPr lang="en-US" dirty="0" smtClean="0"/>
-                  <a:t>is applicable for </a:t>
-                </a:r>
-                <a:r>
-                  <a:rPr lang="en-US" dirty="0"/>
-                  <a:t>hardware </a:t>
-                </a:r>
-                <a:r>
-                  <a:rPr lang="en-US" dirty="0" smtClean="0"/>
-                  <a:t>implementations as well.</a:t>
-                </a:r>
-                <a:endParaRPr lang="en-US" dirty="0"/>
               </a:p>
               <a:p>
                 <a:pPr marL="285750" indent="-285750">
@@ -15077,7 +14935,7 @@
             </p:txBody>
           </p:sp>
         </mc:Choice>
-        <mc:Fallback>
+        <mc:Fallback xmlns="">
           <p:sp>
             <p:nvSpPr>
               <p:cNvPr id="2" name="Content Placeholder 1"/>
@@ -15196,7 +15054,7 @@
           </a:bodyPr>
           <a:lstStyle/>
           <a:p>
-            <a:endParaRPr lang="en-US" sz="1100" b="1" kern="900" spc="100" dirty="0" err="1" smtClean="0">
+            <a:endParaRPr lang="en-US" sz="1100" b="1" kern="900" spc="100" dirty="0" err="1">
               <a:solidFill>
                 <a:srgbClr val="000000"/>
               </a:solidFill>
@@ -16147,7 +16005,7 @@
           </a:bodyPr>
           <a:lstStyle/>
           <a:p>
-            <a:endParaRPr lang="en-US" sz="1100" b="1" kern="900" spc="100" dirty="0" err="1" smtClean="0">
+            <a:endParaRPr lang="en-US" sz="1100" b="1" kern="900" spc="100" dirty="0" err="1">
               <a:solidFill>
                 <a:srgbClr val="000000"/>
               </a:solidFill>
@@ -16287,21 +16145,8 @@
             </a:pPr>
             <a:r>
               <a:rPr lang="en-US" dirty="0"/>
-              <a:t>Decoding FEC chain </a:t>
-            </a:r>
-            <a:r>
-              <a:rPr lang="en-US" dirty="0" smtClean="0"/>
-              <a:t>for Uplink Control </a:t>
-            </a:r>
-            <a:r>
-              <a:rPr lang="en-US" dirty="0"/>
-              <a:t>I</a:t>
-            </a:r>
-            <a:r>
-              <a:rPr lang="en-US" dirty="0" smtClean="0"/>
-              <a:t>nformation (UCI)</a:t>
-            </a:r>
-            <a:endParaRPr lang="en-US" dirty="0"/>
+              <a:t>Decoding FEC chain for Uplink Control Information (UCI)</a:t>
+            </a:r>
           </a:p>
         </p:txBody>
       </p:sp>
@@ -16368,7 +16213,7 @@
           </a:bodyPr>
           <a:lstStyle/>
           <a:p>
-            <a:endParaRPr lang="en-US" sz="1100" b="1" kern="900" spc="100" dirty="0" err="1" smtClean="0">
+            <a:endParaRPr lang="en-US" sz="1100" b="1" kern="900" spc="100" dirty="0" err="1">
               <a:solidFill>
                 <a:srgbClr val="000000"/>
               </a:solidFill>
@@ -16775,7 +16620,7 @@
           </a:bodyPr>
           <a:lstStyle/>
           <a:p>
-            <a:endParaRPr lang="en-US" sz="1100" b="1" kern="900" spc="100" dirty="0" err="1" smtClean="0">
+            <a:endParaRPr lang="en-US" sz="1100" b="1" kern="900" spc="100" dirty="0" err="1">
               <a:solidFill>
                 <a:srgbClr val="000000"/>
               </a:solidFill>
@@ -17230,34 +17075,13 @@
           <a:lstStyle/>
           <a:p>
             <a:r>
-              <a:rPr lang="en-US" dirty="0" smtClean="0">
-                <a:solidFill>
-                  <a:schemeClr val="bg2"/>
-                </a:solidFill>
-              </a:rPr>
-              <a:t>Decoding</a:t>
-            </a:r>
-            <a:r>
               <a:rPr lang="en-US" dirty="0">
                 <a:solidFill>
                   <a:schemeClr val="bg2"/>
                 </a:solidFill>
               </a:rPr>
-              <a:t>: Optimized CN, VN and bit </a:t>
-            </a:r>
-            <a:r>
-              <a:rPr lang="en-US" dirty="0" smtClean="0">
-                <a:solidFill>
-                  <a:schemeClr val="bg2"/>
-                </a:solidFill>
-              </a:rPr>
-              <a:t>combination</a:t>
-            </a:r>
-            <a:endParaRPr lang="en-US" dirty="0">
-              <a:solidFill>
-                <a:schemeClr val="bg2"/>
-              </a:solidFill>
-            </a:endParaRPr>
+              <a:t>Decoding: Optimized CN, VN and bit combination</a:t>
+            </a:r>
           </a:p>
         </p:txBody>
       </p:sp>
@@ -18188,8 +18012,8 @@
           </p:sp>
         </mc:Fallback>
       </mc:AlternateContent>
-      <mc:AlternateContent xmlns:mc="http://schemas.openxmlformats.org/markup-compatibility/2006">
-        <mc:Choice xmlns:a14="http://schemas.microsoft.com/office/drawing/2010/main" Requires="a14">
+      <mc:AlternateContent xmlns:mc="http://schemas.openxmlformats.org/markup-compatibility/2006" xmlns:a14="http://schemas.microsoft.com/office/drawing/2010/main">
+        <mc:Choice Requires="a14">
           <p:sp>
             <p:nvSpPr>
               <p:cNvPr id="457" name="Content Placeholder 1"/>
@@ -18390,7 +18214,7 @@
                   <a:buFont typeface="Arial" panose="020B0604020202020204" pitchFamily="34" charset="0"/>
                   <a:buChar char="•"/>
                 </a:pPr>
-                <a:endParaRPr lang="en-US" sz="1200" dirty="0" smtClean="0">
+                <a:endParaRPr lang="en-US" sz="1200" dirty="0">
                   <a:solidFill>
                     <a:prstClr val="black"/>
                   </a:solidFill>
@@ -19362,7 +19186,7 @@
                                 <a:solidFill>
                                   <a:prstClr val="black"/>
                                 </a:solidFill>
-                                <a:latin typeface="+mj-lt"/>
+                                <a:latin typeface="Cambria Math" panose="02040503050406030204" pitchFamily="18" charset="0"/>
                                 <a:ea typeface="Cambria Math" panose="02040503050406030204" pitchFamily="18" charset="0"/>
                               </a:rPr>
                               <m:t>superfluous</m:t>
@@ -19406,7 +19230,7 @@
             </p:txBody>
           </p:sp>
         </mc:Choice>
-        <mc:Fallback>
+        <mc:Fallback xmlns="">
           <p:sp>
             <p:nvSpPr>
               <p:cNvPr id="457" name="Content Placeholder 1"/>
@@ -19477,7 +19301,7 @@
           </a:bodyPr>
           <a:lstStyle/>
           <a:p>
-            <a:endParaRPr lang="en-US" sz="1100" b="1" kern="900" spc="100" dirty="0" err="1" smtClean="0">
+            <a:endParaRPr lang="en-US" sz="1100" b="1" kern="900" spc="100" dirty="0" err="1">
               <a:solidFill>
                 <a:srgbClr val="000000"/>
               </a:solidFill>
@@ -20607,7 +20431,7 @@
           </a:bodyPr>
           <a:lstStyle/>
           <a:p>
-            <a:endParaRPr lang="en-US" sz="1100" b="1" kern="900" spc="100" dirty="0" err="1" smtClean="0">
+            <a:endParaRPr lang="en-US" sz="1100" b="1" kern="900" spc="100" dirty="0" err="1">
               <a:solidFill>
                 <a:srgbClr val="000000"/>
               </a:solidFill>
@@ -20868,7 +20692,7 @@
           </a:bodyPr>
           <a:lstStyle/>
           <a:p>
-            <a:endParaRPr lang="en-US" sz="1100" b="1" kern="900" spc="100" dirty="0" err="1" smtClean="0">
+            <a:endParaRPr lang="en-US" sz="1100" b="1" kern="900" spc="100" dirty="0" err="1">
               <a:solidFill>
                 <a:srgbClr val="000000"/>
               </a:solidFill>
@@ -20910,8 +20734,8 @@
           <a:chExt cx="0" cy="0"/>
         </a:xfrm>
       </p:grpSpPr>
-      <mc:AlternateContent xmlns:mc="http://schemas.openxmlformats.org/markup-compatibility/2006">
-        <mc:Choice xmlns:a14="http://schemas.microsoft.com/office/drawing/2010/main" Requires="a14">
+      <mc:AlternateContent xmlns:mc="http://schemas.openxmlformats.org/markup-compatibility/2006" xmlns:a14="http://schemas.microsoft.com/office/drawing/2010/main">
+        <mc:Choice Requires="a14">
           <p:sp>
             <p:nvSpPr>
               <p:cNvPr id="284" name="Content Placeholder 283"/>
@@ -21151,7 +20975,7 @@
             </p:txBody>
           </p:sp>
         </mc:Choice>
-        <mc:Fallback>
+        <mc:Fallback xmlns="">
           <p:sp>
             <p:nvSpPr>
               <p:cNvPr id="284" name="Content Placeholder 283"/>
@@ -21270,7 +21094,7 @@
           </a:bodyPr>
           <a:lstStyle/>
           <a:p>
-            <a:endParaRPr lang="en-US" sz="1100" b="1" kern="900" spc="100" dirty="0" err="1" smtClean="0">
+            <a:endParaRPr lang="en-US" sz="1100" b="1" kern="900" spc="100" dirty="0" err="1">
               <a:solidFill>
                 <a:srgbClr val="000000"/>
               </a:solidFill>
@@ -21838,7 +21662,7 @@
           </a:bodyPr>
           <a:lstStyle/>
           <a:p>
-            <a:endParaRPr lang="en-US" sz="1100" b="1" kern="900" spc="100" dirty="0" err="1" smtClean="0">
+            <a:endParaRPr lang="en-US" sz="1100" b="1" kern="900" spc="100" dirty="0" err="1">
               <a:solidFill>
                 <a:srgbClr val="000000"/>
               </a:solidFill>
@@ -22925,7 +22749,7 @@
           </a:bodyPr>
           <a:lstStyle/>
           <a:p>
-            <a:endParaRPr lang="en-US" sz="1100" b="1" kern="900" spc="100" dirty="0" err="1" smtClean="0">
+            <a:endParaRPr lang="en-US" sz="1100" b="1" kern="900" spc="100" dirty="0" err="1">
               <a:solidFill>
                 <a:srgbClr val="000000"/>
               </a:solidFill>
@@ -23000,27 +22824,8 @@
                 <a:ea typeface="+mj-ea"/>
                 <a:cs typeface="+mj-cs"/>
               </a:rPr>
-              <a:t>Tree </a:t>
-            </a:r>
-            <a:r>
-              <a:rPr lang="en-US" dirty="0" smtClean="0">
-                <a:solidFill>
-                  <a:schemeClr val="bg2"/>
-                </a:solidFill>
-                <a:latin typeface="+mj-lt"/>
-                <a:ea typeface="+mj-ea"/>
-                <a:cs typeface="+mj-cs"/>
-              </a:rPr>
-              <a:t>pruning</a:t>
-            </a:r>
-            <a:endParaRPr lang="en-US" dirty="0">
-              <a:solidFill>
-                <a:schemeClr val="bg2"/>
-              </a:solidFill>
-              <a:latin typeface="+mj-lt"/>
-              <a:ea typeface="+mj-ea"/>
-              <a:cs typeface="+mj-cs"/>
-            </a:endParaRPr>
+              <a:t>Tree pruning</a:t>
+            </a:r>
           </a:p>
           <a:p>
             <a:pPr marL="461963" lvl="1" indent="-285750">
@@ -23029,15 +22834,7 @@
             </a:pPr>
             <a:r>
               <a:rPr lang="en-US" dirty="0"/>
-              <a:t>Decoding latency can be further reduced by intelligently pruning the decoder tree. </a:t>
-            </a:r>
-            <a:r>
-              <a:rPr lang="en-US" dirty="0" smtClean="0"/>
-              <a:t>Pruning irrespective </a:t>
-            </a:r>
-            <a:r>
-              <a:rPr lang="en-US" dirty="0"/>
-              <a:t>of frozen pattern.</a:t>
+              <a:t>Decoding latency can be further reduced by intelligently pruning the decoder tree. Pruning irrespective of frozen pattern.</a:t>
             </a:r>
           </a:p>
           <a:p>
@@ -23057,29 +22854,8 @@
             </a:pPr>
             <a:r>
               <a:rPr lang="en-US" dirty="0"/>
-              <a:t>H</a:t>
-            </a:r>
-            <a:r>
-              <a:rPr lang="en-US" dirty="0" smtClean="0"/>
-              <a:t>igh </a:t>
-            </a:r>
-            <a:r>
-              <a:rPr lang="en-US" dirty="0"/>
-              <a:t>SNR and low code rate scenarios this method can be used</a:t>
-            </a:r>
-            <a:r>
-              <a:rPr lang="en-US" dirty="0" smtClean="0"/>
-              <a:t>. </a:t>
-            </a:r>
-            <a:r>
-              <a:rPr lang="en-US" dirty="0"/>
-              <a:t>Level of pruning and BLER can be dealt </a:t>
-            </a:r>
-            <a:r>
-              <a:rPr lang="en-US" dirty="0" smtClean="0"/>
-              <a:t>as trade-off.</a:t>
-            </a:r>
-            <a:endParaRPr lang="en-US" dirty="0"/>
+              <a:t>High SNR and low code rate scenarios this method can be used. Level of pruning and BLER can be dealt as trade-off.</a:t>
+            </a:r>
           </a:p>
           <a:p>
             <a:pPr marL="285750" indent="-285750">
@@ -23087,7 +22863,7 @@
               <a:buChar char="•"/>
             </a:pPr>
             <a:r>
-              <a:rPr lang="en-US" dirty="0" smtClean="0">
+              <a:rPr lang="en-US" dirty="0">
                 <a:solidFill>
                   <a:schemeClr val="bg2"/>
                 </a:solidFill>
@@ -23097,14 +22873,6 @@
               </a:rPr>
               <a:t>Unrolling recursion</a:t>
             </a:r>
-            <a:endParaRPr lang="en-US" dirty="0">
-              <a:solidFill>
-                <a:schemeClr val="bg2"/>
-              </a:solidFill>
-              <a:latin typeface="+mj-lt"/>
-              <a:ea typeface="+mj-ea"/>
-              <a:cs typeface="+mj-cs"/>
-            </a:endParaRPr>
           </a:p>
           <a:p>
             <a:pPr marL="461963" lvl="1" indent="-285750">
@@ -23112,20 +22880,8 @@
               <a:buChar char="Ø"/>
             </a:pPr>
             <a:r>
-              <a:rPr lang="en-US" dirty="0" smtClean="0"/>
-              <a:t>Recursion suits hardware </a:t>
-            </a:r>
-            <a:r>
               <a:rPr lang="en-US" dirty="0"/>
-              <a:t>implementation. However in </a:t>
-            </a:r>
-            <a:r>
-              <a:rPr lang="en-US" dirty="0" smtClean="0"/>
-              <a:t>software, it has a </a:t>
-            </a:r>
-            <a:r>
-              <a:rPr lang="en-US" dirty="0"/>
-              <a:t>huge overhead.</a:t>
+              <a:t>Recursion suits hardware implementation. However in software, it has a huge overhead.</a:t>
             </a:r>
           </a:p>
           <a:p>
@@ -23134,12 +22890,8 @@
               <a:buChar char="Ø"/>
             </a:pPr>
             <a:r>
-              <a:rPr lang="en-US" dirty="0" smtClean="0"/>
-              <a:t>Decoder </a:t>
-            </a:r>
-            <a:r>
               <a:rPr lang="en-US" dirty="0"/>
-              <a:t>implementation is unrolled using templates concept of C++.</a:t>
+              <a:t>Decoder implementation is unrolled using templates concept of C++.</a:t>
             </a:r>
           </a:p>
           <a:p>
@@ -23199,18 +22951,13 @@
           <a:lstStyle/>
           <a:p>
             <a:r>
-              <a:rPr lang="en-US" dirty="0" smtClean="0">
+              <a:rPr lang="en-US" dirty="0">
                 <a:solidFill>
                   <a:schemeClr val="bg2"/>
                 </a:solidFill>
               </a:rPr>
               <a:t>Decoder tree pruning and unrolling recursion</a:t>
             </a:r>
-            <a:endParaRPr lang="en-US" dirty="0">
-              <a:solidFill>
-                <a:schemeClr val="bg2"/>
-              </a:solidFill>
-            </a:endParaRPr>
           </a:p>
         </p:txBody>
       </p:sp>
@@ -23270,7 +23017,7 @@
           </a:bodyPr>
           <a:lstStyle/>
           <a:p>
-            <a:endParaRPr lang="en-US" sz="1100" b="1" kern="900" spc="100" dirty="0" err="1" smtClean="0">
+            <a:endParaRPr lang="en-US" sz="1100" b="1" kern="900" spc="100" dirty="0" err="1">
               <a:solidFill>
                 <a:srgbClr val="000000"/>
               </a:solidFill>
@@ -23573,7 +23320,7 @@
           </a:bodyPr>
           <a:lstStyle/>
           <a:p>
-            <a:endParaRPr lang="en-US" sz="1100" b="1" kern="900" spc="100" dirty="0" err="1" smtClean="0">
+            <a:endParaRPr lang="en-US" sz="1100" b="1" kern="900" spc="100" dirty="0" err="1">
               <a:solidFill>
                 <a:srgbClr val="000000"/>
               </a:solidFill>
@@ -24790,7 +24537,7 @@
           </a:bodyPr>
           <a:lstStyle/>
           <a:p>
-            <a:endParaRPr lang="en-US" sz="1100" b="1" kern="900" spc="100" dirty="0" err="1" smtClean="0">
+            <a:endParaRPr lang="en-US" sz="1100" b="1" kern="900" spc="100" dirty="0" err="1">
               <a:solidFill>
                 <a:srgbClr val="000000"/>
               </a:solidFill>
@@ -26305,7 +26052,7 @@
           </a:bodyPr>
           <a:lstStyle/>
           <a:p>
-            <a:endParaRPr lang="en-US" sz="1100" b="1" kern="900" spc="100" dirty="0" err="1" smtClean="0">
+            <a:endParaRPr lang="en-US" sz="1100" b="1" kern="900" spc="100" dirty="0" err="1">
               <a:solidFill>
                 <a:srgbClr val="000000"/>
               </a:solidFill>
@@ -27253,7 +27000,7 @@
           </a:bodyPr>
           <a:lstStyle/>
           <a:p>
-            <a:endParaRPr lang="en-US" sz="1100" b="1" kern="900" spc="100" dirty="0" err="1" smtClean="0">
+            <a:endParaRPr lang="en-US" sz="1100" b="1" kern="900" spc="100" dirty="0" err="1">
               <a:solidFill>
                 <a:srgbClr val="000000"/>
               </a:solidFill>
@@ -27275,13 +27022,6 @@
   <p:clrMapOvr>
     <a:masterClrMapping/>
   </p:clrMapOvr>
-  <p:timing>
-    <p:tnLst>
-      <p:par>
-        <p:cTn id="1" dur="indefinite" restart="never" nodeType="tmRoot"/>
-      </p:par>
-    </p:tnLst>
-  </p:timing>
 </p:sld>
 </file>
 
@@ -27817,27 +27557,8 @@
                           <a:ea typeface="+mn-ea"/>
                           <a:cs typeface="+mn-cs"/>
                         </a:rPr>
-                        <a:t>[1</a:t>
+                        <a:t>[1]* (8-bit LLR)</a:t>
                       </a:r>
-                      <a:r>
-                        <a:rPr lang="en-US" sz="1000" b="0" kern="1200" baseline="0" dirty="0" smtClean="0">
-                          <a:solidFill>
-                            <a:schemeClr val="tx1"/>
-                          </a:solidFill>
-                          <a:latin typeface="+mn-lt"/>
-                          <a:ea typeface="+mn-ea"/>
-                          <a:cs typeface="+mn-cs"/>
-                        </a:rPr>
-                        <a:t>]* (8-bit LLR)</a:t>
-                      </a:r>
-                      <a:endParaRPr lang="en-US" sz="1000" b="0" kern="1200" baseline="0" dirty="0">
-                        <a:solidFill>
-                          <a:schemeClr val="tx1"/>
-                        </a:solidFill>
-                        <a:latin typeface="+mn-lt"/>
-                        <a:ea typeface="+mn-ea"/>
-                        <a:cs typeface="+mn-cs"/>
-                      </a:endParaRPr>
                     </a:p>
                   </a:txBody>
                   <a:tcPr>
@@ -27916,27 +27637,8 @@
                           <a:ea typeface="+mn-ea"/>
                           <a:cs typeface="+mn-cs"/>
                         </a:rPr>
-                        <a:t>This </a:t>
+                        <a:t>This work (16-bit LLR)</a:t>
                       </a:r>
-                      <a:r>
-                        <a:rPr lang="en-US" sz="1000" kern="1200" baseline="0" dirty="0" smtClean="0">
-                          <a:solidFill>
-                            <a:schemeClr val="tx1"/>
-                          </a:solidFill>
-                          <a:latin typeface="+mn-lt"/>
-                          <a:ea typeface="+mn-ea"/>
-                          <a:cs typeface="+mn-cs"/>
-                        </a:rPr>
-                        <a:t>work (16-bit LLR)</a:t>
-                      </a:r>
-                      <a:endParaRPr lang="en-US" sz="1000" kern="1200" baseline="0" dirty="0">
-                        <a:solidFill>
-                          <a:schemeClr val="tx1"/>
-                        </a:solidFill>
-                        <a:latin typeface="+mn-lt"/>
-                        <a:ea typeface="+mn-ea"/>
-                        <a:cs typeface="+mn-cs"/>
-                      </a:endParaRPr>
                     </a:p>
                   </a:txBody>
                   <a:tcPr>
@@ -28517,12 +28219,8 @@
               </a:lnSpc>
             </a:pPr>
             <a:r>
-              <a:rPr lang="en-US" sz="1000" b="1" dirty="0" smtClean="0"/>
-              <a:t>Improvement in decoder </a:t>
-            </a:r>
-            <a:r>
               <a:rPr lang="en-US" sz="1000" b="1" dirty="0"/>
-              <a:t>latency:</a:t>
+              <a:t>Improvement in decoder latency:</a:t>
             </a:r>
           </a:p>
         </p:txBody>
@@ -29317,17 +29015,6 @@
               </a:lnSpc>
             </a:pPr>
             <a:r>
-              <a:rPr lang="en-US" sz="1600" dirty="0" smtClean="0">
-                <a:solidFill>
-                  <a:schemeClr val="bg2"/>
-                </a:solidFill>
-                <a:latin typeface="+mj-lt"/>
-                <a:ea typeface="+mj-ea"/>
-                <a:cs typeface="+mj-cs"/>
-              </a:rPr>
-              <a:t>Decoding </a:t>
-            </a:r>
-            <a:r>
               <a:rPr lang="en-US" sz="1600" dirty="0">
                 <a:solidFill>
                   <a:schemeClr val="bg2"/>
@@ -29336,7 +29023,7 @@
                 <a:ea typeface="+mj-ea"/>
                 <a:cs typeface="+mj-cs"/>
               </a:rPr>
-              <a:t>Chain results:</a:t>
+              <a:t>Decoding Chain results:</a:t>
             </a:r>
           </a:p>
         </p:txBody>
@@ -29507,7 +29194,7 @@
           </a:bodyPr>
           <a:lstStyle/>
           <a:p>
-            <a:endParaRPr lang="en-US" sz="1100" b="1" kern="900" spc="100" dirty="0" err="1" smtClean="0">
+            <a:endParaRPr lang="en-US" sz="1100" b="1" kern="900" spc="100" dirty="0" err="1">
               <a:solidFill>
                 <a:srgbClr val="000000"/>
               </a:solidFill>
@@ -29529,13 +29216,6 @@
   <p:clrMapOvr>
     <a:masterClrMapping/>
   </p:clrMapOvr>
-  <p:timing>
-    <p:tnLst>
-      <p:par>
-        <p:cTn id="1" dur="indefinite" restart="never" nodeType="tmRoot"/>
-      </p:par>
-    </p:tnLst>
-  </p:timing>
 </p:sld>
 </file>
 
@@ -29755,7 +29435,7 @@
           </a:bodyPr>
           <a:lstStyle/>
           <a:p>
-            <a:endParaRPr lang="en-US" sz="1100" b="1" kern="900" spc="100" dirty="0" err="1" smtClean="0">
+            <a:endParaRPr lang="en-US" sz="1100" b="1" kern="900" spc="100" dirty="0" err="1">
               <a:solidFill>
                 <a:srgbClr val="000000"/>
               </a:solidFill>
@@ -29925,23 +29605,7 @@
                   <a:srgbClr val="000000"/>
                 </a:solidFill>
               </a:rPr>
-              <a:t>Basic idea is synthesizing either completely noiseless or </a:t>
-            </a:r>
-            <a:r>
-              <a:rPr lang="en-IN" dirty="0" smtClean="0">
-                <a:solidFill>
-                  <a:srgbClr val="000000"/>
-                </a:solidFill>
-              </a:rPr>
-              <a:t>noisy </a:t>
-            </a:r>
-            <a:r>
-              <a:rPr lang="en-IN" dirty="0">
-                <a:solidFill>
-                  <a:srgbClr val="000000"/>
-                </a:solidFill>
-              </a:rPr>
-              <a:t>channels based on SNR.</a:t>
+              <a:t>Basic idea is synthesizing either completely noiseless or noisy channels based on SNR.</a:t>
             </a:r>
           </a:p>
           <a:p>
@@ -30183,8 +29847,8 @@
           </a:p>
         </p:txBody>
       </p:sp>
-      <mc:AlternateContent xmlns:mc="http://schemas.openxmlformats.org/markup-compatibility/2006">
-        <mc:Choice xmlns:a14="http://schemas.microsoft.com/office/drawing/2010/main" Requires="a14">
+      <mc:AlternateContent xmlns:mc="http://schemas.openxmlformats.org/markup-compatibility/2006" xmlns:a14="http://schemas.microsoft.com/office/drawing/2010/main">
+        <mc:Choice Requires="a14">
           <p:sp>
             <p:nvSpPr>
               <p:cNvPr id="26" name="TextBox 25">
@@ -30238,7 +29902,7 @@
             </p:txBody>
           </p:sp>
         </mc:Choice>
-        <mc:Fallback>
+        <mc:Fallback xmlns="">
           <p:sp>
             <p:nvSpPr>
               <p:cNvPr id="26" name="TextBox 25">
@@ -30722,7 +30386,7 @@
                   <a:spcPct val="114000"/>
                 </a:lnSpc>
               </a:pPr>
-              <a:endParaRPr lang="en-US" dirty="0" smtClean="0"/>
+              <a:endParaRPr lang="en-US" dirty="0"/>
             </a:p>
           </p:txBody>
         </p:sp>
@@ -30753,7 +30417,7 @@
           </a:bodyPr>
           <a:lstStyle/>
           <a:p>
-            <a:endParaRPr lang="en-US" sz="1100" b="1" kern="900" spc="100" dirty="0" err="1" smtClean="0">
+            <a:endParaRPr lang="en-US" sz="1100" b="1" kern="900" spc="100" dirty="0" err="1">
               <a:solidFill>
                 <a:srgbClr val="000000"/>
               </a:solidFill>
@@ -30820,8 +30484,8 @@
           </a:prstGeom>
         </p:spPr>
       </p:pic>
-      <mc:AlternateContent xmlns:mc="http://schemas.openxmlformats.org/markup-compatibility/2006">
-        <mc:Choice xmlns:a14="http://schemas.microsoft.com/office/drawing/2010/main" Requires="a14">
+      <mc:AlternateContent xmlns:mc="http://schemas.openxmlformats.org/markup-compatibility/2006" xmlns:a14="http://schemas.microsoft.com/office/drawing/2010/main">
+        <mc:Choice Requires="a14">
           <p:sp>
             <p:nvSpPr>
               <p:cNvPr id="2" name="Content Placeholder 1"/>
@@ -30847,7 +30511,7 @@
                   <a:buChar char="•"/>
                 </a:pPr>
                 <a:r>
-                  <a:rPr lang="en-US" dirty="0" smtClean="0">
+                  <a:rPr lang="en-US" dirty="0">
                     <a:latin typeface="Simplified Arabic Fixed" panose="02070309020205020404" pitchFamily="49" charset="-78"/>
                     <a:cs typeface="Simplified Arabic Fixed" panose="02070309020205020404" pitchFamily="49" charset="-78"/>
                   </a:rPr>
@@ -31738,7 +31402,7 @@
                   <a:t>  </a:t>
                 </a:r>
                 <a:r>
-                  <a:rPr lang="en-US" dirty="0" smtClean="0">
+                  <a:rPr lang="en-US" dirty="0">
                     <a:solidFill>
                       <a:prstClr val="black"/>
                     </a:solidFill>
@@ -31748,7 +31412,7 @@
                   <a:t>//</a:t>
                 </a:r>
                 <a:r>
-                  <a:rPr lang="en-US" b="0" i="0" dirty="0" smtClean="0">
+                  <a:rPr lang="en-US" b="0" i="0" dirty="0">
                     <a:solidFill>
                       <a:prstClr val="black"/>
                     </a:solidFill>
@@ -31757,7 +31421,7 @@
                   <a:t>Superfluous</a:t>
                 </a:r>
                 <a:r>
-                  <a:rPr lang="en-US" i="0" dirty="0" smtClean="0">
+                  <a:rPr lang="en-US" i="0" dirty="0">
                     <a:solidFill>
                       <a:prstClr val="black"/>
                     </a:solidFill>
@@ -31780,7 +31444,7 @@
             </p:txBody>
           </p:sp>
         </mc:Choice>
-        <mc:Fallback>
+        <mc:Fallback xmlns="">
           <p:sp>
             <p:nvSpPr>
               <p:cNvPr id="2" name="Content Placeholder 1"/>
@@ -32292,7 +31956,7 @@
           </a:bodyPr>
           <a:lstStyle/>
           <a:p>
-            <a:endParaRPr lang="en-US" sz="1100" b="1" kern="900" spc="100" dirty="0" err="1" smtClean="0">
+            <a:endParaRPr lang="en-US" sz="1100" b="1" kern="900" spc="100" dirty="0" err="1">
               <a:solidFill>
                 <a:srgbClr val="000000"/>
               </a:solidFill>
@@ -32631,7 +32295,7 @@
           </a:bodyPr>
           <a:lstStyle/>
           <a:p>
-            <a:endParaRPr lang="en-US" sz="1100" b="1" kern="900" spc="100" dirty="0" err="1" smtClean="0">
+            <a:endParaRPr lang="en-US" sz="1100" b="1" kern="900" spc="100" dirty="0" err="1">
               <a:solidFill>
                 <a:srgbClr val="000000"/>
               </a:solidFill>
@@ -32673,8 +32337,8 @@
           <a:chExt cx="0" cy="0"/>
         </a:xfrm>
       </p:grpSpPr>
-      <mc:AlternateContent xmlns:mc="http://schemas.openxmlformats.org/markup-compatibility/2006">
-        <mc:Choice xmlns:a14="http://schemas.microsoft.com/office/drawing/2010/main" Requires="a14">
+      <mc:AlternateContent xmlns:mc="http://schemas.openxmlformats.org/markup-compatibility/2006" xmlns:a14="http://schemas.microsoft.com/office/drawing/2010/main">
+        <mc:Choice Requires="a14">
           <p:sp>
             <p:nvSpPr>
               <p:cNvPr id="2" name="Content Placeholder 1"/>
@@ -34441,7 +34105,7 @@
             </p:txBody>
           </p:sp>
         </mc:Choice>
-        <mc:Fallback>
+        <mc:Fallback xmlns="">
           <p:sp>
             <p:nvSpPr>
               <p:cNvPr id="2" name="Content Placeholder 1"/>
@@ -34690,7 +34354,7 @@
           </a:bodyPr>
           <a:lstStyle/>
           <a:p>
-            <a:endParaRPr lang="en-US" sz="1100" b="1" kern="900" spc="100" dirty="0" err="1" smtClean="0">
+            <a:endParaRPr lang="en-US" sz="1100" b="1" kern="900" spc="100" dirty="0" err="1">
               <a:solidFill>
                 <a:srgbClr val="000000"/>
               </a:solidFill>
@@ -35159,7 +34823,7 @@
           </a:bodyPr>
           <a:lstStyle/>
           <a:p>
-            <a:endParaRPr lang="en-US" sz="1100" b="1" kern="900" spc="100" dirty="0" err="1" smtClean="0">
+            <a:endParaRPr lang="en-US" sz="1100" b="1" kern="900" spc="100" dirty="0" err="1">
               <a:solidFill>
                 <a:srgbClr val="000000"/>
               </a:solidFill>
@@ -35251,21 +34915,8 @@
                   <a:schemeClr val="bg2"/>
                 </a:solidFill>
               </a:rPr>
-              <a:t>Processor </a:t>
-            </a:r>
-            <a:r>
-              <a:rPr lang="en-US" dirty="0" smtClean="0">
-                <a:solidFill>
-                  <a:schemeClr val="bg2"/>
-                </a:solidFill>
-              </a:rPr>
-              <a:t>architecture</a:t>
-            </a:r>
-            <a:endParaRPr lang="en-US" dirty="0">
-              <a:solidFill>
-                <a:schemeClr val="bg2"/>
-              </a:solidFill>
-            </a:endParaRPr>
+              <a:t>Processor architecture</a:t>
+            </a:r>
           </a:p>
         </p:txBody>
       </p:sp>
@@ -35301,7 +34952,7 @@
               </a:rPr>
               <a:t>Cache memory</a:t>
             </a:r>
-            <a:endParaRPr lang="en-US" dirty="0" smtClean="0"/>
+            <a:endParaRPr lang="en-US" dirty="0"/>
           </a:p>
           <a:p>
             <a:pPr marL="461963" lvl="1" indent="-285750">
@@ -35309,12 +34960,8 @@
               <a:buChar char="Ø"/>
             </a:pPr>
             <a:r>
-              <a:rPr lang="en-US" dirty="0" smtClean="0"/>
-              <a:t>Performance </a:t>
-            </a:r>
-            <a:r>
               <a:rPr lang="en-US" dirty="0"/>
-              <a:t>bottleneck in modern processors is accessing main memory.</a:t>
+              <a:t>Performance bottleneck in modern processors is accessing main memory.</a:t>
             </a:r>
           </a:p>
           <a:p>
@@ -35323,12 +34970,8 @@
               <a:buChar char="Ø"/>
             </a:pPr>
             <a:r>
-              <a:rPr lang="en-US" dirty="0" smtClean="0"/>
-              <a:t>Modern processors have </a:t>
-            </a:r>
-            <a:r>
               <a:rPr lang="en-US" dirty="0"/>
-              <a:t>faster memory called cache.</a:t>
+              <a:t>Modern processors have faster memory called cache.</a:t>
             </a:r>
           </a:p>
           <a:p>
@@ -35338,19 +34981,14 @@
             </a:pPr>
             <a:r>
               <a:rPr lang="en-US" dirty="0"/>
-              <a:t>Caches reduce the average memory access </a:t>
-            </a:r>
-            <a:r>
-              <a:rPr lang="en-US" dirty="0" smtClean="0"/>
-              <a:t>latency by storing recently accessed data.</a:t>
-            </a:r>
-            <a:endParaRPr lang="en-US" dirty="0"/>
+              <a:t>Caches reduce the average memory access latency by storing recently accessed data.</a:t>
+            </a:r>
           </a:p>
           <a:p>
             <a:pPr lvl="1" indent="0">
               <a:buNone/>
             </a:pPr>
-            <a:endParaRPr lang="en-US" sz="500" dirty="0" smtClean="0"/>
+            <a:endParaRPr lang="en-US" sz="500" dirty="0"/>
           </a:p>
           <a:p>
             <a:pPr marL="285750" indent="-285750">
@@ -35358,7 +34996,7 @@
               <a:buChar char="•"/>
             </a:pPr>
             <a:r>
-              <a:rPr lang="en-US" dirty="0" smtClean="0">
+              <a:rPr lang="en-US" dirty="0">
                 <a:solidFill>
                   <a:schemeClr val="bg2"/>
                 </a:solidFill>
@@ -35393,31 +35031,7 @@
             </a:pPr>
             <a:r>
               <a:rPr lang="en-US" dirty="0"/>
-              <a:t>Branching and </a:t>
-            </a:r>
-            <a:r>
-              <a:rPr lang="en-US" dirty="0" smtClean="0"/>
-              <a:t>cache </a:t>
-            </a:r>
-            <a:r>
-              <a:rPr lang="en-US" dirty="0"/>
-              <a:t>misses create stalls in pipelining which reduce IPC</a:t>
-            </a:r>
-            <a:r>
-              <a:rPr lang="en-US" dirty="0" smtClean="0"/>
-              <a:t>. They should be reduced to </a:t>
-            </a:r>
-            <a:r>
-              <a:rPr lang="en-US" dirty="0"/>
-              <a:t>achieve </a:t>
-            </a:r>
-            <a:r>
-              <a:rPr lang="en-US" dirty="0" smtClean="0"/>
-              <a:t>good </a:t>
-            </a:r>
-            <a:r>
-              <a:rPr lang="en-US" dirty="0"/>
-              <a:t>performance.</a:t>
+              <a:t>Branching and cache misses create stalls in pipelining which reduce IPC. They should be reduced to achieve good performance.</a:t>
             </a:r>
           </a:p>
           <a:p>
@@ -35500,11 +35114,7 @@
             </a:r>
             <a:r>
               <a:rPr lang="en-US" sz="800" dirty="0"/>
-              <a:t>, “What Every Programmer Should Know About Memory.” Red Hat, Inc</a:t>
-            </a:r>
-            <a:r>
-              <a:rPr lang="en-US" sz="800" dirty="0" smtClean="0"/>
-              <a:t>.</a:t>
+              <a:t>, “What Every Programmer Should Know About Memory.” Red Hat, Inc.</a:t>
             </a:r>
           </a:p>
           <a:p>
@@ -35545,10 +35155,9 @@
               <a:t>Muenchen</a:t>
             </a:r>
             <a:r>
-              <a:rPr lang="en-US" sz="800" dirty="0" smtClean="0"/>
+              <a:rPr lang="en-US" sz="800" dirty="0"/>
               <a:t>,</a:t>
             </a:r>
-            <a:endParaRPr lang="en-US" sz="800" dirty="0" smtClean="0"/>
           </a:p>
         </p:txBody>
       </p:sp>
@@ -35615,7 +35224,7 @@
           </a:bodyPr>
           <a:lstStyle/>
           <a:p>
-            <a:endParaRPr lang="en-US" sz="1100" b="1" kern="900" spc="100" dirty="0" err="1" smtClean="0">
+            <a:endParaRPr lang="en-US" sz="1100" b="1" kern="900" spc="100" dirty="0" err="1">
               <a:solidFill>
                 <a:srgbClr val="000000"/>
               </a:solidFill>

</xml_diff>